<commit_message>
PPP etwas angepasst, Ingredientlist in Klasse gekapselt
</commit_message>
<xml_diff>
--- a/aufgaben/Präsentation.pptx
+++ b/aufgaben/Präsentation.pptx
@@ -106,6 +106,11 @@
       </a:defRPr>
     </a:lvl9pPr>
   </p:defaultTextStyle>
+  <p:extLst>
+    <p:ext uri="{EFAFB233-063F-42B5-8137-9DF3F51BA10A}">
+      <p15:sldGuideLst xmlns:p15="http://schemas.microsoft.com/office/powerpoint/2012/main"/>
+    </p:ext>
+  </p:extLst>
 </p:presentation>
 </file>
 
@@ -6151,15 +6156,7 @@
                     <a:p>
                       <a:r>
                         <a:rPr lang="de-CH" dirty="0" smtClean="0"/>
-                        <a:t>Webserver eingerichtet, </a:t>
-                      </a:r>
-                      <a:r>
-                        <a:rPr lang="de-CH" dirty="0" smtClean="0"/>
-                        <a:t>so </a:t>
-                      </a:r>
-                      <a:r>
-                        <a:rPr lang="de-CH" dirty="0" smtClean="0"/>
-                        <a:t>nicht mehr ersichtlich -</a:t>
+                        <a:t>Webserver eingerichtet, so nicht mehr ersichtlich -</a:t>
                       </a:r>
                       <a:r>
                         <a:rPr lang="de-CH" baseline="0" dirty="0" smtClean="0"/>
@@ -6510,7 +6507,7 @@
             <p:ph idx="1"/>
             <p:extLst>
               <p:ext uri="{D42A27DB-BD31-4B8C-83A1-F6EECF244321}">
-                <p14:modId xmlns:p14="http://schemas.microsoft.com/office/powerpoint/2010/main" val="1475848614"/>
+                <p14:modId xmlns:p14="http://schemas.microsoft.com/office/powerpoint/2010/main" val="3427966500"/>
               </p:ext>
             </p:extLst>
           </p:nvPr>
@@ -6766,8 +6763,12 @@
                     <a:lstStyle/>
                     <a:p>
                       <a:r>
+                        <a:rPr lang="de-CH" smtClean="0"/>
+                        <a:t>Bewertung </a:t>
+                      </a:r>
+                      <a:r>
                         <a:rPr lang="de-CH" dirty="0" smtClean="0"/>
-                        <a:t>Refresh-Button in Mixer mit AJAX, Bewertung mit</a:t>
+                        <a:t>mit</a:t>
                       </a:r>
                       <a:r>
                         <a:rPr lang="de-CH" baseline="0" dirty="0" smtClean="0"/>

</xml_diff>

<commit_message>
pink squirrel, präsentation, drinklist filter
</commit_message>
<xml_diff>
--- a/aufgaben/Präsentation.pptx
+++ b/aufgaben/Präsentation.pptx
@@ -6,8 +6,11 @@
   </p:sldMasterIdLst>
   <p:sldIdLst>
     <p:sldId id="256" r:id="rId2"/>
-    <p:sldId id="257" r:id="rId3"/>
-    <p:sldId id="258" r:id="rId4"/>
+    <p:sldId id="259" r:id="rId3"/>
+    <p:sldId id="260" r:id="rId4"/>
+    <p:sldId id="262" r:id="rId5"/>
+    <p:sldId id="257" r:id="rId6"/>
+    <p:sldId id="258" r:id="rId7"/>
   </p:sldIdLst>
   <p:sldSz cx="12192000" cy="6858000"/>
   <p:notesSz cx="6858000" cy="9144000"/>
@@ -836,7 +839,7 @@
           <a:p>
             <a:fld id="{E8375435-6FE3-4E9C-86FA-601B67E0DBDB}" type="datetimeFigureOut">
               <a:rPr lang="de-CH" smtClean="0"/>
-              <a:t>28.12.2016</a:t>
+              <a:t>07.01.2017</a:t>
             </a:fld>
             <a:endParaRPr lang="de-CH"/>
           </a:p>
@@ -1087,7 +1090,7 @@
           <a:p>
             <a:fld id="{E8375435-6FE3-4E9C-86FA-601B67E0DBDB}" type="datetimeFigureOut">
               <a:rPr lang="de-CH" smtClean="0"/>
-              <a:t>28.12.2016</a:t>
+              <a:t>07.01.2017</a:t>
             </a:fld>
             <a:endParaRPr lang="de-CH"/>
           </a:p>
@@ -1401,7 +1404,7 @@
           <a:p>
             <a:fld id="{E8375435-6FE3-4E9C-86FA-601B67E0DBDB}" type="datetimeFigureOut">
               <a:rPr lang="de-CH" smtClean="0"/>
-              <a:t>28.12.2016</a:t>
+              <a:t>07.01.2017</a:t>
             </a:fld>
             <a:endParaRPr lang="de-CH"/>
           </a:p>
@@ -1742,7 +1745,7 @@
           <a:p>
             <a:fld id="{E8375435-6FE3-4E9C-86FA-601B67E0DBDB}" type="datetimeFigureOut">
               <a:rPr lang="de-CH" smtClean="0"/>
-              <a:t>28.12.2016</a:t>
+              <a:t>07.01.2017</a:t>
             </a:fld>
             <a:endParaRPr lang="de-CH"/>
           </a:p>
@@ -2056,7 +2059,7 @@
           <a:p>
             <a:fld id="{E8375435-6FE3-4E9C-86FA-601B67E0DBDB}" type="datetimeFigureOut">
               <a:rPr lang="de-CH" smtClean="0"/>
-              <a:t>28.12.2016</a:t>
+              <a:t>07.01.2017</a:t>
             </a:fld>
             <a:endParaRPr lang="de-CH"/>
           </a:p>
@@ -2449,7 +2452,7 @@
           <a:p>
             <a:fld id="{E8375435-6FE3-4E9C-86FA-601B67E0DBDB}" type="datetimeFigureOut">
               <a:rPr lang="de-CH" smtClean="0"/>
-              <a:t>28.12.2016</a:t>
+              <a:t>07.01.2017</a:t>
             </a:fld>
             <a:endParaRPr lang="de-CH"/>
           </a:p>
@@ -2619,7 +2622,7 @@
           <a:p>
             <a:fld id="{E8375435-6FE3-4E9C-86FA-601B67E0DBDB}" type="datetimeFigureOut">
               <a:rPr lang="de-CH" smtClean="0"/>
-              <a:t>28.12.2016</a:t>
+              <a:t>07.01.2017</a:t>
             </a:fld>
             <a:endParaRPr lang="de-CH"/>
           </a:p>
@@ -2799,7 +2802,7 @@
           <a:p>
             <a:fld id="{E8375435-6FE3-4E9C-86FA-601B67E0DBDB}" type="datetimeFigureOut">
               <a:rPr lang="de-CH" smtClean="0"/>
-              <a:t>28.12.2016</a:t>
+              <a:t>07.01.2017</a:t>
             </a:fld>
             <a:endParaRPr lang="de-CH"/>
           </a:p>
@@ -2975,7 +2978,7 @@
           <a:p>
             <a:fld id="{E8375435-6FE3-4E9C-86FA-601B67E0DBDB}" type="datetimeFigureOut">
               <a:rPr lang="de-CH" smtClean="0"/>
-              <a:t>28.12.2016</a:t>
+              <a:t>07.01.2017</a:t>
             </a:fld>
             <a:endParaRPr lang="de-CH"/>
           </a:p>
@@ -3222,7 +3225,7 @@
           <a:p>
             <a:fld id="{E8375435-6FE3-4E9C-86FA-601B67E0DBDB}" type="datetimeFigureOut">
               <a:rPr lang="de-CH" smtClean="0"/>
-              <a:t>28.12.2016</a:t>
+              <a:t>07.01.2017</a:t>
             </a:fld>
             <a:endParaRPr lang="de-CH"/>
           </a:p>
@@ -3454,7 +3457,7 @@
           <a:p>
             <a:fld id="{E8375435-6FE3-4E9C-86FA-601B67E0DBDB}" type="datetimeFigureOut">
               <a:rPr lang="de-CH" smtClean="0"/>
-              <a:t>28.12.2016</a:t>
+              <a:t>07.01.2017</a:t>
             </a:fld>
             <a:endParaRPr lang="de-CH"/>
           </a:p>
@@ -3828,7 +3831,7 @@
           <a:p>
             <a:fld id="{E8375435-6FE3-4E9C-86FA-601B67E0DBDB}" type="datetimeFigureOut">
               <a:rPr lang="de-CH" smtClean="0"/>
-              <a:t>28.12.2016</a:t>
+              <a:t>07.01.2017</a:t>
             </a:fld>
             <a:endParaRPr lang="de-CH"/>
           </a:p>
@@ -3951,7 +3954,7 @@
           <a:p>
             <a:fld id="{E8375435-6FE3-4E9C-86FA-601B67E0DBDB}" type="datetimeFigureOut">
               <a:rPr lang="de-CH" smtClean="0"/>
-              <a:t>28.12.2016</a:t>
+              <a:t>07.01.2017</a:t>
             </a:fld>
             <a:endParaRPr lang="de-CH"/>
           </a:p>
@@ -4046,7 +4049,7 @@
           <a:p>
             <a:fld id="{E8375435-6FE3-4E9C-86FA-601B67E0DBDB}" type="datetimeFigureOut">
               <a:rPr lang="de-CH" smtClean="0"/>
-              <a:t>28.12.2016</a:t>
+              <a:t>07.01.2017</a:t>
             </a:fld>
             <a:endParaRPr lang="de-CH"/>
           </a:p>
@@ -4301,7 +4304,7 @@
           <a:p>
             <a:fld id="{E8375435-6FE3-4E9C-86FA-601B67E0DBDB}" type="datetimeFigureOut">
               <a:rPr lang="de-CH" smtClean="0"/>
-              <a:t>28.12.2016</a:t>
+              <a:t>07.01.2017</a:t>
             </a:fld>
             <a:endParaRPr lang="de-CH"/>
           </a:p>
@@ -4564,7 +4567,7 @@
           <a:p>
             <a:fld id="{E8375435-6FE3-4E9C-86FA-601B67E0DBDB}" type="datetimeFigureOut">
               <a:rPr lang="de-CH" smtClean="0"/>
-              <a:t>28.12.2016</a:t>
+              <a:t>07.01.2017</a:t>
             </a:fld>
             <a:endParaRPr lang="de-CH"/>
           </a:p>
@@ -5307,7 +5310,7 @@
           <a:p>
             <a:fld id="{E8375435-6FE3-4E9C-86FA-601B67E0DBDB}" type="datetimeFigureOut">
               <a:rPr lang="de-CH" smtClean="0"/>
-              <a:t>28.12.2016</a:t>
+              <a:t>07.01.2017</a:t>
             </a:fld>
             <a:endParaRPr lang="de-CH"/>
           </a:p>
@@ -5929,522 +5932,64 @@
           <a:bodyPr/>
           <a:lstStyle/>
           <a:p>
+            <a:r>
+              <a:rPr lang="de-CH" dirty="0" err="1"/>
+              <a:t>motivación</a:t>
+            </a:r>
             <a:endParaRPr lang="de-CH" dirty="0"/>
           </a:p>
         </p:txBody>
       </p:sp>
-      <p:graphicFrame>
-        <p:nvGraphicFramePr>
-          <p:cNvPr id="4" name="Inhaltsplatzhalter 3"/>
-          <p:cNvGraphicFramePr>
-            <a:graphicFrameLocks noGrp="1"/>
-          </p:cNvGraphicFramePr>
+      <p:sp>
+        <p:nvSpPr>
+          <p:cNvPr id="3" name="Inhaltsplatzhalter 2"/>
+          <p:cNvSpPr>
+            <a:spLocks noGrp="1"/>
+          </p:cNvSpPr>
           <p:nvPr>
             <p:ph idx="1"/>
-            <p:extLst>
-              <p:ext uri="{D42A27DB-BD31-4B8C-83A1-F6EECF244321}">
-                <p14:modId xmlns:p14="http://schemas.microsoft.com/office/powerpoint/2010/main" val="3422291247"/>
-              </p:ext>
-            </p:extLst>
-          </p:nvPr>
-        </p:nvGraphicFramePr>
-        <p:xfrm>
-          <a:off x="677863" y="2160588"/>
-          <a:ext cx="8596312" cy="6791960"/>
-        </p:xfrm>
-        <a:graphic>
-          <a:graphicData uri="http://schemas.openxmlformats.org/drawingml/2006/table">
-            <a:tbl>
-              <a:tblPr firstRow="1" bandRow="1">
-                <a:tableStyleId>{5C22544A-7EE6-4342-B048-85BDC9FD1C3A}</a:tableStyleId>
-              </a:tblPr>
-              <a:tblGrid>
-                <a:gridCol w="3081337"/>
-                <a:gridCol w="5514975"/>
-              </a:tblGrid>
-              <a:tr h="370840">
-                <a:tc>
-                  <a:txBody>
-                    <a:bodyPr/>
-                    <a:lstStyle/>
-                    <a:p>
-                      <a:r>
-                        <a:rPr lang="de-CH" dirty="0" smtClean="0"/>
-                        <a:t>Aufgabe</a:t>
-                      </a:r>
-                      <a:endParaRPr lang="de-CH" dirty="0"/>
-                    </a:p>
-                  </a:txBody>
-                  <a:tcPr/>
-                </a:tc>
-                <a:tc>
-                  <a:txBody>
-                    <a:bodyPr/>
-                    <a:lstStyle/>
-                    <a:p>
-                      <a:r>
-                        <a:rPr lang="de-CH" dirty="0" smtClean="0"/>
-                        <a:t>Umsetzung</a:t>
-                      </a:r>
-                      <a:endParaRPr lang="de-CH" dirty="0"/>
-                    </a:p>
-                  </a:txBody>
-                  <a:tcPr/>
-                </a:tc>
-              </a:tr>
-              <a:tr h="370840">
-                <a:tc>
-                  <a:txBody>
-                    <a:bodyPr/>
-                    <a:lstStyle/>
-                    <a:p>
-                      <a:r>
-                        <a:rPr lang="de-CH" dirty="0" smtClean="0"/>
-                        <a:t>1 - Setup, Content, Site </a:t>
-                      </a:r>
-                      <a:r>
-                        <a:rPr lang="de-CH" dirty="0" err="1" smtClean="0"/>
-                        <a:t>Structure</a:t>
-                      </a:r>
-                      <a:r>
-                        <a:rPr lang="de-CH" dirty="0" smtClean="0"/>
-                        <a:t>,</a:t>
-                      </a:r>
-                      <a:r>
-                        <a:rPr lang="de-CH" baseline="0" dirty="0" smtClean="0"/>
-                        <a:t> Page </a:t>
-                      </a:r>
-                      <a:r>
-                        <a:rPr lang="de-CH" baseline="0" dirty="0" err="1" smtClean="0"/>
-                        <a:t>Structure</a:t>
-                      </a:r>
-                      <a:endParaRPr lang="de-CH" dirty="0"/>
-                    </a:p>
-                  </a:txBody>
-                  <a:tcPr/>
-                </a:tc>
-                <a:tc>
-                  <a:txBody>
-                    <a:bodyPr/>
-                    <a:lstStyle/>
-                    <a:p>
-                      <a:r>
-                        <a:rPr lang="de-CH" dirty="0" smtClean="0"/>
-                        <a:t>Nicht direkt in Website ersichtlich</a:t>
-                      </a:r>
-                      <a:endParaRPr lang="de-CH" dirty="0"/>
-                    </a:p>
-                  </a:txBody>
-                  <a:tcPr/>
-                </a:tc>
-              </a:tr>
-              <a:tr h="370840">
-                <a:tc>
-                  <a:txBody>
-                    <a:bodyPr/>
-                    <a:lstStyle/>
-                    <a:p>
-                      <a:r>
-                        <a:rPr lang="de-CH" dirty="0" smtClean="0"/>
-                        <a:t>2 - HTML5-Tutorial,</a:t>
-                      </a:r>
-                      <a:r>
-                        <a:rPr lang="de-CH" baseline="0" dirty="0" smtClean="0"/>
-                        <a:t> Main Page (Content, Layout, Styling)</a:t>
-                      </a:r>
-                      <a:endParaRPr lang="de-CH" dirty="0"/>
-                    </a:p>
-                  </a:txBody>
-                  <a:tcPr/>
-                </a:tc>
-                <a:tc>
-                  <a:txBody>
-                    <a:bodyPr/>
-                    <a:lstStyle/>
-                    <a:p>
-                      <a:r>
-                        <a:rPr lang="de-CH" dirty="0" smtClean="0"/>
-                        <a:t>Grundaufbau/Design</a:t>
-                      </a:r>
-                      <a:r>
-                        <a:rPr lang="de-CH" baseline="0" dirty="0" smtClean="0"/>
-                        <a:t> der Seite</a:t>
-                      </a:r>
-                      <a:endParaRPr lang="de-CH" dirty="0"/>
-                    </a:p>
-                  </a:txBody>
-                  <a:tcPr/>
-                </a:tc>
-              </a:tr>
-              <a:tr h="370840">
-                <a:tc>
-                  <a:txBody>
-                    <a:bodyPr/>
-                    <a:lstStyle/>
-                    <a:p>
-                      <a:r>
-                        <a:rPr lang="de-CH" dirty="0" smtClean="0"/>
-                        <a:t>3 - XAMPP </a:t>
-                      </a:r>
-                      <a:r>
-                        <a:rPr lang="de-CH" dirty="0" err="1" smtClean="0"/>
-                        <a:t>and</a:t>
-                      </a:r>
-                      <a:r>
-                        <a:rPr lang="de-CH" dirty="0" smtClean="0"/>
-                        <a:t> IDE,</a:t>
-                      </a:r>
-                      <a:r>
-                        <a:rPr lang="de-CH" baseline="0" dirty="0" smtClean="0"/>
-                        <a:t> PHP, </a:t>
-                      </a:r>
-                      <a:r>
-                        <a:rPr lang="de-CH" baseline="0" dirty="0" err="1" smtClean="0"/>
-                        <a:t>Modularization</a:t>
-                      </a:r>
-                      <a:endParaRPr lang="de-CH" dirty="0"/>
-                    </a:p>
-                  </a:txBody>
-                  <a:tcPr/>
-                </a:tc>
-                <a:tc>
-                  <a:txBody>
-                    <a:bodyPr/>
-                    <a:lstStyle/>
-                    <a:p>
-                      <a:r>
-                        <a:rPr lang="de-CH" dirty="0" smtClean="0"/>
-                        <a:t>Navigation-Menu</a:t>
-                      </a:r>
-                      <a:r>
-                        <a:rPr lang="de-CH" baseline="0" dirty="0" smtClean="0"/>
-                        <a:t> mit PHP, aktuelle Seite sieht im Menu anders aus, diverse Styling- und Modularisierungsaktivitäten</a:t>
-                      </a:r>
-                      <a:endParaRPr lang="de-CH" dirty="0"/>
-                    </a:p>
-                  </a:txBody>
-                  <a:tcPr/>
-                </a:tc>
-              </a:tr>
-              <a:tr h="370840">
-                <a:tc>
-                  <a:txBody>
-                    <a:bodyPr/>
-                    <a:lstStyle/>
-                    <a:p>
-                      <a:r>
-                        <a:rPr lang="de-CH" dirty="0" smtClean="0"/>
-                        <a:t>4 - Public</a:t>
-                      </a:r>
-                      <a:r>
-                        <a:rPr lang="de-CH" baseline="0" dirty="0" smtClean="0"/>
-                        <a:t> Webserver, Multi-Page PHP, Multilingual Text, More </a:t>
-                      </a:r>
-                      <a:r>
-                        <a:rPr lang="de-CH" baseline="0" dirty="0" err="1" smtClean="0"/>
-                        <a:t>Functions</a:t>
-                      </a:r>
-                      <a:endParaRPr lang="de-CH" dirty="0"/>
-                    </a:p>
-                  </a:txBody>
-                  <a:tcPr/>
-                </a:tc>
-                <a:tc>
-                  <a:txBody>
-                    <a:bodyPr/>
-                    <a:lstStyle/>
-                    <a:p>
-                      <a:r>
-                        <a:rPr lang="de-CH" dirty="0" smtClean="0"/>
-                        <a:t>Webserver eingerichtet, so nicht mehr ersichtlich -</a:t>
-                      </a:r>
-                      <a:r>
-                        <a:rPr lang="de-CH" baseline="0" dirty="0" smtClean="0"/>
-                        <a:t> umgebaut (MVC), Mehrsprachigkeit umgesetzt – später wegen neuem Auftrag geändert, weitere Funktionen fortlaufend hinzugefügt.</a:t>
-                      </a:r>
-                      <a:endParaRPr lang="de-CH" dirty="0"/>
-                    </a:p>
-                  </a:txBody>
-                  <a:tcPr/>
-                </a:tc>
-              </a:tr>
-              <a:tr h="370840">
-                <a:tc>
-                  <a:txBody>
-                    <a:bodyPr/>
-                    <a:lstStyle/>
-                    <a:p>
-                      <a:r>
-                        <a:rPr lang="de-CH" dirty="0" smtClean="0"/>
-                        <a:t>5 - </a:t>
-                      </a:r>
-                      <a:r>
-                        <a:rPr lang="de-CH" dirty="0" err="1" smtClean="0"/>
-                        <a:t>Product</a:t>
-                      </a:r>
-                      <a:r>
-                        <a:rPr lang="de-CH" baseline="0" dirty="0" smtClean="0"/>
-                        <a:t> Options Form</a:t>
-                      </a:r>
-                      <a:endParaRPr lang="de-CH" dirty="0"/>
-                    </a:p>
-                  </a:txBody>
-                  <a:tcPr/>
-                </a:tc>
-                <a:tc>
-                  <a:txBody>
-                    <a:bodyPr/>
-                    <a:lstStyle/>
-                    <a:p>
-                      <a:r>
-                        <a:rPr lang="de-CH" dirty="0" smtClean="0"/>
-                        <a:t>Navigation per</a:t>
-                      </a:r>
-                      <a:r>
-                        <a:rPr lang="de-CH" baseline="0" dirty="0" smtClean="0"/>
-                        <a:t> Link von </a:t>
-                      </a:r>
-                      <a:r>
-                        <a:rPr lang="de-CH" baseline="0" dirty="0" err="1" smtClean="0"/>
-                        <a:t>Drinkliste</a:t>
-                      </a:r>
-                      <a:r>
-                        <a:rPr lang="de-CH" baseline="0" dirty="0" smtClean="0"/>
-                        <a:t> zu Drink, Mixer ist ein aufwändiges Formular</a:t>
-                      </a:r>
-                      <a:endParaRPr lang="de-CH" dirty="0"/>
-                    </a:p>
-                  </a:txBody>
-                  <a:tcPr/>
-                </a:tc>
-              </a:tr>
-              <a:tr h="370840">
-                <a:tc>
-                  <a:txBody>
-                    <a:bodyPr/>
-                    <a:lstStyle/>
-                    <a:p>
-                      <a:r>
-                        <a:rPr lang="de-CH" dirty="0" smtClean="0"/>
-                        <a:t>5 – </a:t>
-                      </a:r>
-                      <a:r>
-                        <a:rPr lang="de-CH" dirty="0" err="1" smtClean="0"/>
-                        <a:t>Shipping</a:t>
-                      </a:r>
-                      <a:r>
-                        <a:rPr lang="de-CH" baseline="0" dirty="0" smtClean="0"/>
-                        <a:t> Form</a:t>
-                      </a:r>
-                      <a:endParaRPr lang="de-CH" dirty="0"/>
-                    </a:p>
-                  </a:txBody>
-                  <a:tcPr/>
-                </a:tc>
-                <a:tc>
-                  <a:txBody>
-                    <a:bodyPr/>
-                    <a:lstStyle/>
-                    <a:p>
-                      <a:r>
-                        <a:rPr lang="de-CH" dirty="0" smtClean="0"/>
-                        <a:t>Registration,</a:t>
-                      </a:r>
-                      <a:r>
-                        <a:rPr lang="de-CH" baseline="0" dirty="0" smtClean="0"/>
-                        <a:t> Mixer</a:t>
-                      </a:r>
-                      <a:endParaRPr lang="de-CH" dirty="0"/>
-                    </a:p>
-                  </a:txBody>
-                  <a:tcPr/>
-                </a:tc>
-              </a:tr>
-              <a:tr h="370840">
-                <a:tc>
-                  <a:txBody>
-                    <a:bodyPr/>
-                    <a:lstStyle/>
-                    <a:p>
-                      <a:r>
-                        <a:rPr lang="de-CH" dirty="0" smtClean="0"/>
-                        <a:t>5 – </a:t>
-                      </a:r>
-                      <a:r>
-                        <a:rPr lang="de-CH" dirty="0" err="1" smtClean="0"/>
-                        <a:t>Confirmation</a:t>
-                      </a:r>
-                      <a:r>
-                        <a:rPr lang="de-CH" baseline="0" dirty="0" smtClean="0"/>
-                        <a:t> Form</a:t>
-                      </a:r>
-                      <a:endParaRPr lang="de-CH" dirty="0"/>
-                    </a:p>
-                  </a:txBody>
-                  <a:tcPr/>
-                </a:tc>
-                <a:tc>
-                  <a:txBody>
-                    <a:bodyPr/>
-                    <a:lstStyle/>
-                    <a:p>
-                      <a:r>
-                        <a:rPr lang="de-CH" dirty="0" smtClean="0"/>
-                        <a:t>Drink</a:t>
-                      </a:r>
-                      <a:r>
-                        <a:rPr lang="de-CH" baseline="0" dirty="0" smtClean="0"/>
-                        <a:t> nach Mixer bestätigen, Mail auslösen</a:t>
-                      </a:r>
-                      <a:endParaRPr lang="de-CH" dirty="0"/>
-                    </a:p>
-                  </a:txBody>
-                  <a:tcPr/>
-                </a:tc>
-              </a:tr>
-              <a:tr h="370840">
-                <a:tc>
-                  <a:txBody>
-                    <a:bodyPr/>
-                    <a:lstStyle/>
-                    <a:p>
-                      <a:r>
-                        <a:rPr lang="de-CH" dirty="0" smtClean="0"/>
-                        <a:t>6 – </a:t>
-                      </a:r>
-                      <a:r>
-                        <a:rPr lang="de-CH" dirty="0" err="1" smtClean="0"/>
-                        <a:t>Purchase</a:t>
-                      </a:r>
-                      <a:r>
-                        <a:rPr lang="de-CH" dirty="0" smtClean="0"/>
-                        <a:t> </a:t>
-                      </a:r>
-                      <a:r>
-                        <a:rPr lang="de-CH" dirty="0" err="1" smtClean="0"/>
-                        <a:t>Confirmation</a:t>
-                      </a:r>
-                      <a:endParaRPr lang="de-CH" dirty="0"/>
-                    </a:p>
-                  </a:txBody>
-                  <a:tcPr/>
-                </a:tc>
-                <a:tc>
-                  <a:txBody>
-                    <a:bodyPr/>
-                    <a:lstStyle/>
-                    <a:p>
-                      <a:pPr marL="0" marR="0" lvl="0" indent="0" algn="l" defTabSz="457200" rtl="0" eaLnBrk="1" fontAlgn="auto" latinLnBrk="0" hangingPunct="1">
-                        <a:lnSpc>
-                          <a:spcPct val="100000"/>
-                        </a:lnSpc>
-                        <a:spcBef>
-                          <a:spcPts val="0"/>
-                        </a:spcBef>
-                        <a:spcAft>
-                          <a:spcPts val="0"/>
-                        </a:spcAft>
-                        <a:buClrTx/>
-                        <a:buSzTx/>
-                        <a:buFontTx/>
-                        <a:buNone/>
-                        <a:tabLst/>
-                        <a:defRPr/>
-                      </a:pPr>
-                      <a:r>
-                        <a:rPr lang="de-CH" dirty="0" smtClean="0"/>
-                        <a:t>Drink</a:t>
-                      </a:r>
-                      <a:r>
-                        <a:rPr lang="de-CH" baseline="0" dirty="0" smtClean="0"/>
-                        <a:t> nach Mixer bestätigen, Mail auslösen, Navigation auf Drink-Detailseite</a:t>
-                      </a:r>
-                      <a:endParaRPr lang="de-CH" dirty="0" smtClean="0"/>
-                    </a:p>
-                  </a:txBody>
-                  <a:tcPr/>
-                </a:tc>
-              </a:tr>
-              <a:tr h="370840">
-                <a:tc>
-                  <a:txBody>
-                    <a:bodyPr/>
-                    <a:lstStyle/>
-                    <a:p>
-                      <a:r>
-                        <a:rPr lang="de-CH" dirty="0" smtClean="0"/>
-                        <a:t>6 – Form Validation</a:t>
-                      </a:r>
-                      <a:endParaRPr lang="de-CH" dirty="0"/>
-                    </a:p>
-                  </a:txBody>
-                  <a:tcPr/>
-                </a:tc>
-                <a:tc>
-                  <a:txBody>
-                    <a:bodyPr/>
-                    <a:lstStyle/>
-                    <a:p>
-                      <a:r>
-                        <a:rPr lang="de-CH" dirty="0" smtClean="0"/>
-                        <a:t>Registration,</a:t>
-                      </a:r>
-                      <a:r>
-                        <a:rPr lang="de-CH" baseline="0" dirty="0" smtClean="0"/>
-                        <a:t> Login</a:t>
-                      </a:r>
-                      <a:endParaRPr lang="de-CH" dirty="0"/>
-                    </a:p>
-                  </a:txBody>
-                  <a:tcPr/>
-                </a:tc>
-              </a:tr>
-              <a:tr h="370840">
-                <a:tc>
-                  <a:txBody>
-                    <a:bodyPr/>
-                    <a:lstStyle/>
-                    <a:p>
-                      <a:r>
-                        <a:rPr lang="de-CH" dirty="0" smtClean="0"/>
-                        <a:t>6 – Dynamic Features</a:t>
-                      </a:r>
-                      <a:endParaRPr lang="de-CH" dirty="0"/>
-                    </a:p>
-                  </a:txBody>
-                  <a:tcPr/>
-                </a:tc>
-                <a:tc>
-                  <a:txBody>
-                    <a:bodyPr/>
-                    <a:lstStyle/>
-                    <a:p>
-                      <a:r>
-                        <a:rPr lang="de-CH" dirty="0" err="1" smtClean="0"/>
-                        <a:t>Lightbox</a:t>
-                      </a:r>
-                      <a:r>
-                        <a:rPr lang="de-CH" dirty="0" smtClean="0"/>
-                        <a:t>, diverse</a:t>
-                      </a:r>
-                      <a:r>
-                        <a:rPr lang="de-CH" baseline="0" dirty="0" smtClean="0"/>
-                        <a:t> kleinere Dinge</a:t>
-                      </a:r>
-                      <a:endParaRPr lang="de-CH" dirty="0"/>
-                    </a:p>
-                  </a:txBody>
-                  <a:tcPr/>
-                </a:tc>
-              </a:tr>
-            </a:tbl>
-          </a:graphicData>
-        </a:graphic>
-      </p:graphicFrame>
+          </p:nvPr>
+        </p:nvSpPr>
+        <p:spPr/>
+        <p:txBody>
+          <a:bodyPr/>
+          <a:lstStyle/>
+          <a:p>
+            <a:r>
+              <a:rPr lang="de-CH" dirty="0" smtClean="0"/>
+              <a:t>Hartes Studium</a:t>
+            </a:r>
+          </a:p>
+          <a:p>
+            <a:r>
+              <a:rPr lang="de-CH" dirty="0" smtClean="0"/>
+              <a:t>Nötige Ablenkung durch Alkohol</a:t>
+            </a:r>
+          </a:p>
+          <a:p>
+            <a:r>
+              <a:rPr lang="de-CH" dirty="0" smtClean="0"/>
+              <a:t>Abwechslungsreiches Trinken</a:t>
+            </a:r>
+          </a:p>
+          <a:p>
+            <a:r>
+              <a:rPr lang="de-CH" dirty="0" smtClean="0"/>
+              <a:t>Keine unnötigen Mittelmass-Wiederholungen</a:t>
+            </a:r>
+          </a:p>
+          <a:p>
+            <a:r>
+              <a:rPr lang="de-CH" dirty="0" smtClean="0"/>
+              <a:t>Genussoptimierung durch Erinnerungsstütze</a:t>
+            </a:r>
+          </a:p>
+        </p:txBody>
+      </p:sp>
     </p:spTree>
     <p:extLst>
       <p:ext uri="{BB962C8B-B14F-4D97-AF65-F5344CB8AC3E}">
-        <p14:creationId xmlns:p14="http://schemas.microsoft.com/office/powerpoint/2010/main" val="4104868263"/>
+        <p14:creationId xmlns:p14="http://schemas.microsoft.com/office/powerpoint/2010/main" val="126974961"/>
       </p:ext>
     </p:extLst>
   </p:cSld>
@@ -6493,10 +6038,366 @@
           <a:bodyPr/>
           <a:lstStyle/>
           <a:p>
+            <a:r>
+              <a:rPr lang="de-CH" dirty="0" smtClean="0"/>
+              <a:t>Demo</a:t>
+            </a:r>
             <a:endParaRPr lang="de-CH" dirty="0"/>
           </a:p>
         </p:txBody>
       </p:sp>
+      <p:sp>
+        <p:nvSpPr>
+          <p:cNvPr id="3" name="Inhaltsplatzhalter 2"/>
+          <p:cNvSpPr>
+            <a:spLocks noGrp="1"/>
+          </p:cNvSpPr>
+          <p:nvPr>
+            <p:ph idx="1"/>
+          </p:nvPr>
+        </p:nvSpPr>
+        <p:spPr/>
+        <p:txBody>
+          <a:bodyPr>
+            <a:normAutofit lnSpcReduction="10000"/>
+          </a:bodyPr>
+          <a:lstStyle/>
+          <a:p>
+            <a:r>
+              <a:rPr lang="de-CH" dirty="0" smtClean="0"/>
+              <a:t>Hauptseite</a:t>
+            </a:r>
+          </a:p>
+          <a:p>
+            <a:r>
+              <a:rPr lang="de-CH" dirty="0" smtClean="0"/>
+              <a:t>Alle Drinks</a:t>
+            </a:r>
+          </a:p>
+          <a:p>
+            <a:pPr lvl="1"/>
+            <a:r>
+              <a:rPr lang="de-CH" dirty="0" smtClean="0"/>
+              <a:t>Filter</a:t>
+            </a:r>
+          </a:p>
+          <a:p>
+            <a:pPr lvl="1"/>
+            <a:r>
+              <a:rPr lang="de-CH" dirty="0" smtClean="0"/>
+              <a:t>Absprung auf Drink</a:t>
+            </a:r>
+          </a:p>
+          <a:p>
+            <a:pPr lvl="1"/>
+            <a:r>
+              <a:rPr lang="de-CH" dirty="0" smtClean="0"/>
+              <a:t>Keine Bewertung möglich</a:t>
+            </a:r>
+          </a:p>
+          <a:p>
+            <a:r>
+              <a:rPr lang="de-CH" dirty="0" smtClean="0"/>
+              <a:t>Über </a:t>
+            </a:r>
+            <a:r>
+              <a:rPr lang="de-CH" dirty="0" err="1" smtClean="0"/>
+              <a:t>DreamDrink</a:t>
+            </a:r>
+            <a:endParaRPr lang="de-CH" dirty="0" smtClean="0"/>
+          </a:p>
+          <a:p>
+            <a:r>
+              <a:rPr lang="de-CH" dirty="0" smtClean="0"/>
+              <a:t>Change </a:t>
+            </a:r>
+            <a:r>
+              <a:rPr lang="de-CH" dirty="0" err="1" smtClean="0"/>
+              <a:t>to</a:t>
+            </a:r>
+            <a:r>
+              <a:rPr lang="de-CH" dirty="0" smtClean="0"/>
+              <a:t> English</a:t>
+            </a:r>
+          </a:p>
+          <a:p>
+            <a:r>
+              <a:rPr lang="de-CH" dirty="0" smtClean="0"/>
+              <a:t>Move </a:t>
+            </a:r>
+            <a:r>
+              <a:rPr lang="de-CH" dirty="0" err="1" smtClean="0"/>
+              <a:t>To</a:t>
+            </a:r>
+            <a:r>
+              <a:rPr lang="de-CH" dirty="0" smtClean="0"/>
+              <a:t> Google</a:t>
+            </a:r>
+          </a:p>
+          <a:p>
+            <a:r>
+              <a:rPr lang="de-CH" dirty="0" err="1" smtClean="0"/>
+              <a:t>Come</a:t>
+            </a:r>
+            <a:r>
+              <a:rPr lang="de-CH" dirty="0" smtClean="0"/>
+              <a:t> Back </a:t>
+            </a:r>
+            <a:r>
+              <a:rPr lang="de-CH" dirty="0" err="1" smtClean="0"/>
+              <a:t>to</a:t>
+            </a:r>
+            <a:r>
+              <a:rPr lang="de-CH" dirty="0" smtClean="0"/>
+              <a:t> </a:t>
+            </a:r>
+            <a:r>
+              <a:rPr lang="de-CH" dirty="0" err="1" smtClean="0"/>
+              <a:t>Drinklist</a:t>
+            </a:r>
+            <a:endParaRPr lang="de-CH" dirty="0" smtClean="0"/>
+          </a:p>
+          <a:p>
+            <a:r>
+              <a:rPr lang="de-CH" dirty="0" smtClean="0"/>
+              <a:t>Zurück zum Deutsch</a:t>
+            </a:r>
+            <a:endParaRPr lang="de-CH" dirty="0"/>
+          </a:p>
+        </p:txBody>
+      </p:sp>
+    </p:spTree>
+    <p:extLst>
+      <p:ext uri="{BB962C8B-B14F-4D97-AF65-F5344CB8AC3E}">
+        <p14:creationId xmlns:p14="http://schemas.microsoft.com/office/powerpoint/2010/main" val="2986236237"/>
+      </p:ext>
+    </p:extLst>
+  </p:cSld>
+  <p:clrMapOvr>
+    <a:masterClrMapping/>
+  </p:clrMapOvr>
+  <p:timing>
+    <p:tnLst>
+      <p:par>
+        <p:cTn id="1" dur="indefinite" restart="never" nodeType="tmRoot"/>
+      </p:par>
+    </p:tnLst>
+  </p:timing>
+</p:sld>
+</file>
+
+<file path=ppt/slides/slide4.xml><?xml version="1.0" encoding="utf-8"?>
+<p:sld xmlns:a="http://schemas.openxmlformats.org/drawingml/2006/main" xmlns:r="http://schemas.openxmlformats.org/officeDocument/2006/relationships" xmlns:p="http://schemas.openxmlformats.org/presentationml/2006/main">
+  <p:cSld>
+    <p:spTree>
+      <p:nvGrpSpPr>
+        <p:cNvPr id="1" name=""/>
+        <p:cNvGrpSpPr/>
+        <p:nvPr/>
+      </p:nvGrpSpPr>
+      <p:grpSpPr>
+        <a:xfrm>
+          <a:off x="0" y="0"/>
+          <a:ext cx="0" cy="0"/>
+          <a:chOff x="0" y="0"/>
+          <a:chExt cx="0" cy="0"/>
+        </a:xfrm>
+      </p:grpSpPr>
+      <p:sp>
+        <p:nvSpPr>
+          <p:cNvPr id="2" name="Titel 1"/>
+          <p:cNvSpPr>
+            <a:spLocks noGrp="1"/>
+          </p:cNvSpPr>
+          <p:nvPr>
+            <p:ph type="title"/>
+          </p:nvPr>
+        </p:nvSpPr>
+        <p:spPr/>
+        <p:txBody>
+          <a:bodyPr/>
+          <a:lstStyle/>
+          <a:p>
+            <a:r>
+              <a:rPr lang="de-CH" dirty="0" smtClean="0"/>
+              <a:t>Demo</a:t>
+            </a:r>
+            <a:endParaRPr lang="de-CH" dirty="0"/>
+          </a:p>
+        </p:txBody>
+      </p:sp>
+      <p:sp>
+        <p:nvSpPr>
+          <p:cNvPr id="3" name="Inhaltsplatzhalter 2"/>
+          <p:cNvSpPr>
+            <a:spLocks noGrp="1"/>
+          </p:cNvSpPr>
+          <p:nvPr>
+            <p:ph idx="1"/>
+          </p:nvPr>
+        </p:nvSpPr>
+        <p:spPr/>
+        <p:txBody>
+          <a:bodyPr>
+            <a:normAutofit fontScale="62500" lnSpcReduction="20000"/>
+          </a:bodyPr>
+          <a:lstStyle/>
+          <a:p>
+            <a:r>
+              <a:rPr lang="de-CH" dirty="0" smtClean="0"/>
+              <a:t>Registration </a:t>
+            </a:r>
+            <a:r>
+              <a:rPr lang="de-CH" dirty="0" err="1" smtClean="0"/>
+              <a:t>Testuser</a:t>
+            </a:r>
+            <a:endParaRPr lang="de-CH" dirty="0" smtClean="0"/>
+          </a:p>
+          <a:p>
+            <a:pPr lvl="1"/>
+            <a:r>
+              <a:rPr lang="de-CH" dirty="0" smtClean="0"/>
+              <a:t>Mail zeigen?</a:t>
+            </a:r>
+          </a:p>
+          <a:p>
+            <a:r>
+              <a:rPr lang="de-CH" dirty="0" smtClean="0"/>
+              <a:t>Login </a:t>
+            </a:r>
+            <a:r>
+              <a:rPr lang="de-CH" dirty="0" err="1" smtClean="0"/>
+              <a:t>Testuser</a:t>
+            </a:r>
+            <a:endParaRPr lang="de-CH" dirty="0" smtClean="0"/>
+          </a:p>
+          <a:p>
+            <a:r>
+              <a:rPr lang="de-CH" dirty="0" smtClean="0"/>
+              <a:t>Bewerten eines Drinks</a:t>
+            </a:r>
+          </a:p>
+          <a:p>
+            <a:r>
+              <a:rPr lang="de-CH" dirty="0" err="1" smtClean="0"/>
+              <a:t>Logout</a:t>
+            </a:r>
+            <a:endParaRPr lang="de-CH" dirty="0" smtClean="0"/>
+          </a:p>
+          <a:p>
+            <a:r>
+              <a:rPr lang="de-CH" dirty="0" smtClean="0"/>
+              <a:t>Login Admin</a:t>
+            </a:r>
+          </a:p>
+          <a:p>
+            <a:r>
+              <a:rPr lang="de-CH" dirty="0" smtClean="0"/>
+              <a:t>Bewerten des Drinks</a:t>
+            </a:r>
+          </a:p>
+          <a:p>
+            <a:r>
+              <a:rPr lang="de-CH" dirty="0" smtClean="0"/>
+              <a:t>Welchen Drink möchte das Publikum erfassen?</a:t>
+            </a:r>
+          </a:p>
+          <a:p>
+            <a:pPr lvl="1"/>
+            <a:r>
+              <a:rPr lang="de-CH" dirty="0" smtClean="0"/>
+              <a:t>Möglichst mit fehlenden Zutaten (White </a:t>
+            </a:r>
+            <a:r>
+              <a:rPr lang="de-CH" dirty="0" err="1" smtClean="0"/>
+              <a:t>Russian</a:t>
+            </a:r>
+            <a:r>
+              <a:rPr lang="de-CH" dirty="0" smtClean="0"/>
+              <a:t> mit Kaffeelikör)</a:t>
+            </a:r>
+          </a:p>
+          <a:p>
+            <a:r>
+              <a:rPr lang="de-CH" dirty="0" smtClean="0"/>
+              <a:t>Zutaten im Admin GUI erfassen</a:t>
+            </a:r>
+          </a:p>
+          <a:p>
+            <a:r>
+              <a:rPr lang="de-CH" dirty="0" smtClean="0"/>
+              <a:t>Drink nach Publikums-Wunsch erstellen</a:t>
+            </a:r>
+          </a:p>
+          <a:p>
+            <a:r>
+              <a:rPr lang="de-CH" dirty="0" smtClean="0"/>
+              <a:t>Bild hinzufügen (Admin GUI)</a:t>
+            </a:r>
+          </a:p>
+          <a:p>
+            <a:r>
+              <a:rPr lang="de-CH" dirty="0" smtClean="0"/>
+              <a:t>Drink nochmals anschauen, bewerten, suchen</a:t>
+            </a:r>
+          </a:p>
+          <a:p>
+            <a:r>
+              <a:rPr lang="de-CH" dirty="0" err="1" smtClean="0"/>
+              <a:t>Reschponiv</a:t>
+            </a:r>
+            <a:r>
+              <a:rPr lang="de-CH" dirty="0" smtClean="0"/>
+              <a:t> – ausgiebig </a:t>
+            </a:r>
+            <a:r>
+              <a:rPr lang="de-CH" smtClean="0"/>
+              <a:t>drauf rumtanzen</a:t>
+            </a:r>
+            <a:endParaRPr lang="de-CH" dirty="0" smtClean="0"/>
+          </a:p>
+          <a:p>
+            <a:endParaRPr lang="de-CH" dirty="0"/>
+          </a:p>
+        </p:txBody>
+      </p:sp>
+    </p:spTree>
+    <p:extLst>
+      <p:ext uri="{BB962C8B-B14F-4D97-AF65-F5344CB8AC3E}">
+        <p14:creationId xmlns:p14="http://schemas.microsoft.com/office/powerpoint/2010/main" val="3212320855"/>
+      </p:ext>
+    </p:extLst>
+  </p:cSld>
+  <p:clrMapOvr>
+    <a:masterClrMapping/>
+  </p:clrMapOvr>
+  <p:timing>
+    <p:tnLst>
+      <p:par>
+        <p:cTn id="1" dur="indefinite" restart="never" nodeType="tmRoot"/>
+      </p:par>
+    </p:tnLst>
+  </p:timing>
+</p:sld>
+</file>
+
+<file path=ppt/slides/slide5.xml><?xml version="1.0" encoding="utf-8"?>
+<p:sld xmlns:a="http://schemas.openxmlformats.org/drawingml/2006/main" xmlns:r="http://schemas.openxmlformats.org/officeDocument/2006/relationships" xmlns:p="http://schemas.openxmlformats.org/presentationml/2006/main">
+  <p:cSld>
+    <p:spTree>
+      <p:nvGrpSpPr>
+        <p:cNvPr id="1" name=""/>
+        <p:cNvGrpSpPr/>
+        <p:nvPr/>
+      </p:nvGrpSpPr>
+      <p:grpSpPr>
+        <a:xfrm>
+          <a:off x="0" y="0"/>
+          <a:ext cx="0" cy="0"/>
+          <a:chOff x="0" y="0"/>
+          <a:chExt cx="0" cy="0"/>
+        </a:xfrm>
+      </p:grpSpPr>
       <p:graphicFrame>
         <p:nvGraphicFramePr>
           <p:cNvPr id="4" name="Inhaltsplatzhalter 3"/>
@@ -6507,13 +6408,562 @@
             <p:ph idx="1"/>
             <p:extLst>
               <p:ext uri="{D42A27DB-BD31-4B8C-83A1-F6EECF244321}">
-                <p14:modId xmlns:p14="http://schemas.microsoft.com/office/powerpoint/2010/main" val="3427966500"/>
+                <p14:modId xmlns:p14="http://schemas.microsoft.com/office/powerpoint/2010/main" val="2744432999"/>
               </p:ext>
             </p:extLst>
           </p:nvPr>
         </p:nvGraphicFramePr>
         <p:xfrm>
-          <a:off x="677863" y="2160588"/>
+          <a:off x="537968" y="66040"/>
+          <a:ext cx="8596312" cy="6791960"/>
+        </p:xfrm>
+        <a:graphic>
+          <a:graphicData uri="http://schemas.openxmlformats.org/drawingml/2006/table">
+            <a:tbl>
+              <a:tblPr firstRow="1" bandRow="1">
+                <a:tableStyleId>{5C22544A-7EE6-4342-B048-85BDC9FD1C3A}</a:tableStyleId>
+              </a:tblPr>
+              <a:tblGrid>
+                <a:gridCol w="3081337"/>
+                <a:gridCol w="5514975"/>
+              </a:tblGrid>
+              <a:tr h="370840">
+                <a:tc>
+                  <a:txBody>
+                    <a:bodyPr/>
+                    <a:lstStyle/>
+                    <a:p>
+                      <a:r>
+                        <a:rPr lang="de-CH" dirty="0" smtClean="0"/>
+                        <a:t>Aufgabe</a:t>
+                      </a:r>
+                      <a:endParaRPr lang="de-CH" dirty="0"/>
+                    </a:p>
+                  </a:txBody>
+                  <a:tcPr/>
+                </a:tc>
+                <a:tc>
+                  <a:txBody>
+                    <a:bodyPr/>
+                    <a:lstStyle/>
+                    <a:p>
+                      <a:r>
+                        <a:rPr lang="de-CH" dirty="0" smtClean="0"/>
+                        <a:t>Umsetzung</a:t>
+                      </a:r>
+                      <a:endParaRPr lang="de-CH" dirty="0"/>
+                    </a:p>
+                  </a:txBody>
+                  <a:tcPr/>
+                </a:tc>
+              </a:tr>
+              <a:tr h="370840">
+                <a:tc>
+                  <a:txBody>
+                    <a:bodyPr/>
+                    <a:lstStyle/>
+                    <a:p>
+                      <a:r>
+                        <a:rPr lang="de-CH" dirty="0" smtClean="0"/>
+                        <a:t>1 - Setup, Content, Site </a:t>
+                      </a:r>
+                      <a:r>
+                        <a:rPr lang="de-CH" dirty="0" err="1" smtClean="0"/>
+                        <a:t>Structure</a:t>
+                      </a:r>
+                      <a:r>
+                        <a:rPr lang="de-CH" dirty="0" smtClean="0"/>
+                        <a:t>,</a:t>
+                      </a:r>
+                      <a:r>
+                        <a:rPr lang="de-CH" baseline="0" dirty="0" smtClean="0"/>
+                        <a:t> Page </a:t>
+                      </a:r>
+                      <a:r>
+                        <a:rPr lang="de-CH" baseline="0" dirty="0" err="1" smtClean="0"/>
+                        <a:t>Structure</a:t>
+                      </a:r>
+                      <a:endParaRPr lang="de-CH" dirty="0"/>
+                    </a:p>
+                  </a:txBody>
+                  <a:tcPr/>
+                </a:tc>
+                <a:tc>
+                  <a:txBody>
+                    <a:bodyPr/>
+                    <a:lstStyle/>
+                    <a:p>
+                      <a:r>
+                        <a:rPr lang="de-CH" dirty="0" smtClean="0"/>
+                        <a:t>Nicht direkt in Website ersichtlich</a:t>
+                      </a:r>
+                      <a:endParaRPr lang="de-CH" dirty="0"/>
+                    </a:p>
+                  </a:txBody>
+                  <a:tcPr/>
+                </a:tc>
+              </a:tr>
+              <a:tr h="370840">
+                <a:tc>
+                  <a:txBody>
+                    <a:bodyPr/>
+                    <a:lstStyle/>
+                    <a:p>
+                      <a:r>
+                        <a:rPr lang="de-CH" dirty="0" smtClean="0"/>
+                        <a:t>2 - HTML5-Tutorial,</a:t>
+                      </a:r>
+                      <a:r>
+                        <a:rPr lang="de-CH" baseline="0" dirty="0" smtClean="0"/>
+                        <a:t> Main Page (Content, Layout, Styling)</a:t>
+                      </a:r>
+                      <a:endParaRPr lang="de-CH" dirty="0"/>
+                    </a:p>
+                  </a:txBody>
+                  <a:tcPr/>
+                </a:tc>
+                <a:tc>
+                  <a:txBody>
+                    <a:bodyPr/>
+                    <a:lstStyle/>
+                    <a:p>
+                      <a:r>
+                        <a:rPr lang="de-CH" dirty="0" smtClean="0"/>
+                        <a:t>Grundaufbau/Design</a:t>
+                      </a:r>
+                      <a:r>
+                        <a:rPr lang="de-CH" baseline="0" dirty="0" smtClean="0"/>
+                        <a:t> der Seite</a:t>
+                      </a:r>
+                      <a:endParaRPr lang="de-CH" dirty="0"/>
+                    </a:p>
+                  </a:txBody>
+                  <a:tcPr/>
+                </a:tc>
+              </a:tr>
+              <a:tr h="370840">
+                <a:tc>
+                  <a:txBody>
+                    <a:bodyPr/>
+                    <a:lstStyle/>
+                    <a:p>
+                      <a:r>
+                        <a:rPr lang="de-CH" dirty="0" smtClean="0"/>
+                        <a:t>3 - XAMPP </a:t>
+                      </a:r>
+                      <a:r>
+                        <a:rPr lang="de-CH" dirty="0" err="1" smtClean="0"/>
+                        <a:t>and</a:t>
+                      </a:r>
+                      <a:r>
+                        <a:rPr lang="de-CH" dirty="0" smtClean="0"/>
+                        <a:t> IDE,</a:t>
+                      </a:r>
+                      <a:r>
+                        <a:rPr lang="de-CH" baseline="0" dirty="0" smtClean="0"/>
+                        <a:t> PHP, </a:t>
+                      </a:r>
+                      <a:r>
+                        <a:rPr lang="de-CH" baseline="0" dirty="0" err="1" smtClean="0"/>
+                        <a:t>Modularization</a:t>
+                      </a:r>
+                      <a:endParaRPr lang="de-CH" dirty="0"/>
+                    </a:p>
+                  </a:txBody>
+                  <a:tcPr/>
+                </a:tc>
+                <a:tc>
+                  <a:txBody>
+                    <a:bodyPr/>
+                    <a:lstStyle/>
+                    <a:p>
+                      <a:r>
+                        <a:rPr lang="de-CH" dirty="0" smtClean="0"/>
+                        <a:t>Navigation-Menu</a:t>
+                      </a:r>
+                      <a:r>
+                        <a:rPr lang="de-CH" baseline="0" dirty="0" smtClean="0"/>
+                        <a:t> mit PHP, aktuelle Seite sieht im Menu anders aus, diverse Styling- und Modularisierungsaktivitäten</a:t>
+                      </a:r>
+                      <a:endParaRPr lang="de-CH" dirty="0"/>
+                    </a:p>
+                  </a:txBody>
+                  <a:tcPr/>
+                </a:tc>
+              </a:tr>
+              <a:tr h="370840">
+                <a:tc>
+                  <a:txBody>
+                    <a:bodyPr/>
+                    <a:lstStyle/>
+                    <a:p>
+                      <a:r>
+                        <a:rPr lang="de-CH" dirty="0" smtClean="0"/>
+                        <a:t>4 - Public</a:t>
+                      </a:r>
+                      <a:r>
+                        <a:rPr lang="de-CH" baseline="0" dirty="0" smtClean="0"/>
+                        <a:t> Webserver, Multi-Page PHP, Multilingual Text, More </a:t>
+                      </a:r>
+                      <a:r>
+                        <a:rPr lang="de-CH" baseline="0" dirty="0" err="1" smtClean="0"/>
+                        <a:t>Functions</a:t>
+                      </a:r>
+                      <a:endParaRPr lang="de-CH" dirty="0"/>
+                    </a:p>
+                  </a:txBody>
+                  <a:tcPr/>
+                </a:tc>
+                <a:tc>
+                  <a:txBody>
+                    <a:bodyPr/>
+                    <a:lstStyle/>
+                    <a:p>
+                      <a:r>
+                        <a:rPr lang="de-CH" dirty="0" smtClean="0"/>
+                        <a:t>Webserver eingerichtet, so nicht mehr ersichtlich -</a:t>
+                      </a:r>
+                      <a:r>
+                        <a:rPr lang="de-CH" baseline="0" dirty="0" smtClean="0"/>
+                        <a:t> umgebaut (MVC), Mehrsprachigkeit umgesetzt – später wegen neuem Auftrag geändert, weitere Funktionen fortlaufend hinzugefügt.</a:t>
+                      </a:r>
+                      <a:endParaRPr lang="de-CH" dirty="0"/>
+                    </a:p>
+                  </a:txBody>
+                  <a:tcPr/>
+                </a:tc>
+              </a:tr>
+              <a:tr h="370840">
+                <a:tc>
+                  <a:txBody>
+                    <a:bodyPr/>
+                    <a:lstStyle/>
+                    <a:p>
+                      <a:r>
+                        <a:rPr lang="de-CH" dirty="0" smtClean="0"/>
+                        <a:t>5 - </a:t>
+                      </a:r>
+                      <a:r>
+                        <a:rPr lang="de-CH" dirty="0" err="1" smtClean="0"/>
+                        <a:t>Product</a:t>
+                      </a:r>
+                      <a:r>
+                        <a:rPr lang="de-CH" baseline="0" dirty="0" smtClean="0"/>
+                        <a:t> Options Form</a:t>
+                      </a:r>
+                      <a:endParaRPr lang="de-CH" dirty="0"/>
+                    </a:p>
+                  </a:txBody>
+                  <a:tcPr/>
+                </a:tc>
+                <a:tc>
+                  <a:txBody>
+                    <a:bodyPr/>
+                    <a:lstStyle/>
+                    <a:p>
+                      <a:r>
+                        <a:rPr lang="de-CH" dirty="0" smtClean="0"/>
+                        <a:t>Navigation per</a:t>
+                      </a:r>
+                      <a:r>
+                        <a:rPr lang="de-CH" baseline="0" dirty="0" smtClean="0"/>
+                        <a:t> Link von </a:t>
+                      </a:r>
+                      <a:r>
+                        <a:rPr lang="de-CH" baseline="0" dirty="0" err="1" smtClean="0"/>
+                        <a:t>Drinkliste</a:t>
+                      </a:r>
+                      <a:r>
+                        <a:rPr lang="de-CH" baseline="0" dirty="0" smtClean="0"/>
+                        <a:t> zu Drink, Mixer ist ein aufwändiges Formular</a:t>
+                      </a:r>
+                      <a:endParaRPr lang="de-CH" dirty="0"/>
+                    </a:p>
+                  </a:txBody>
+                  <a:tcPr/>
+                </a:tc>
+              </a:tr>
+              <a:tr h="370840">
+                <a:tc>
+                  <a:txBody>
+                    <a:bodyPr/>
+                    <a:lstStyle/>
+                    <a:p>
+                      <a:r>
+                        <a:rPr lang="de-CH" dirty="0" smtClean="0"/>
+                        <a:t>5 – </a:t>
+                      </a:r>
+                      <a:r>
+                        <a:rPr lang="de-CH" dirty="0" err="1" smtClean="0"/>
+                        <a:t>Shipping</a:t>
+                      </a:r>
+                      <a:r>
+                        <a:rPr lang="de-CH" baseline="0" dirty="0" smtClean="0"/>
+                        <a:t> Form</a:t>
+                      </a:r>
+                      <a:endParaRPr lang="de-CH" dirty="0"/>
+                    </a:p>
+                  </a:txBody>
+                  <a:tcPr/>
+                </a:tc>
+                <a:tc>
+                  <a:txBody>
+                    <a:bodyPr/>
+                    <a:lstStyle/>
+                    <a:p>
+                      <a:r>
+                        <a:rPr lang="de-CH" dirty="0" smtClean="0"/>
+                        <a:t>Registration,</a:t>
+                      </a:r>
+                      <a:r>
+                        <a:rPr lang="de-CH" baseline="0" dirty="0" smtClean="0"/>
+                        <a:t> Mixer</a:t>
+                      </a:r>
+                      <a:endParaRPr lang="de-CH" dirty="0"/>
+                    </a:p>
+                  </a:txBody>
+                  <a:tcPr/>
+                </a:tc>
+              </a:tr>
+              <a:tr h="370840">
+                <a:tc>
+                  <a:txBody>
+                    <a:bodyPr/>
+                    <a:lstStyle/>
+                    <a:p>
+                      <a:r>
+                        <a:rPr lang="de-CH" dirty="0" smtClean="0"/>
+                        <a:t>5 – </a:t>
+                      </a:r>
+                      <a:r>
+                        <a:rPr lang="de-CH" dirty="0" err="1" smtClean="0"/>
+                        <a:t>Confirmation</a:t>
+                      </a:r>
+                      <a:r>
+                        <a:rPr lang="de-CH" baseline="0" dirty="0" smtClean="0"/>
+                        <a:t> Form</a:t>
+                      </a:r>
+                      <a:endParaRPr lang="de-CH" dirty="0"/>
+                    </a:p>
+                  </a:txBody>
+                  <a:tcPr/>
+                </a:tc>
+                <a:tc>
+                  <a:txBody>
+                    <a:bodyPr/>
+                    <a:lstStyle/>
+                    <a:p>
+                      <a:r>
+                        <a:rPr lang="de-CH" dirty="0" smtClean="0"/>
+                        <a:t>Drink</a:t>
+                      </a:r>
+                      <a:r>
+                        <a:rPr lang="de-CH" baseline="0" dirty="0" smtClean="0"/>
+                        <a:t> nach Mixer bestätigen, Mail auslösen</a:t>
+                      </a:r>
+                      <a:endParaRPr lang="de-CH" dirty="0"/>
+                    </a:p>
+                  </a:txBody>
+                  <a:tcPr/>
+                </a:tc>
+              </a:tr>
+              <a:tr h="370840">
+                <a:tc>
+                  <a:txBody>
+                    <a:bodyPr/>
+                    <a:lstStyle/>
+                    <a:p>
+                      <a:r>
+                        <a:rPr lang="de-CH" dirty="0" smtClean="0"/>
+                        <a:t>6 – </a:t>
+                      </a:r>
+                      <a:r>
+                        <a:rPr lang="de-CH" dirty="0" err="1" smtClean="0"/>
+                        <a:t>Purchase</a:t>
+                      </a:r>
+                      <a:r>
+                        <a:rPr lang="de-CH" dirty="0" smtClean="0"/>
+                        <a:t> </a:t>
+                      </a:r>
+                      <a:r>
+                        <a:rPr lang="de-CH" dirty="0" err="1" smtClean="0"/>
+                        <a:t>Confirmation</a:t>
+                      </a:r>
+                      <a:endParaRPr lang="de-CH" dirty="0"/>
+                    </a:p>
+                  </a:txBody>
+                  <a:tcPr/>
+                </a:tc>
+                <a:tc>
+                  <a:txBody>
+                    <a:bodyPr/>
+                    <a:lstStyle/>
+                    <a:p>
+                      <a:pPr marL="0" marR="0" lvl="0" indent="0" algn="l" defTabSz="457200" rtl="0" eaLnBrk="1" fontAlgn="auto" latinLnBrk="0" hangingPunct="1">
+                        <a:lnSpc>
+                          <a:spcPct val="100000"/>
+                        </a:lnSpc>
+                        <a:spcBef>
+                          <a:spcPts val="0"/>
+                        </a:spcBef>
+                        <a:spcAft>
+                          <a:spcPts val="0"/>
+                        </a:spcAft>
+                        <a:buClrTx/>
+                        <a:buSzTx/>
+                        <a:buFontTx/>
+                        <a:buNone/>
+                        <a:tabLst/>
+                        <a:defRPr/>
+                      </a:pPr>
+                      <a:r>
+                        <a:rPr lang="de-CH" dirty="0" smtClean="0"/>
+                        <a:t>Drink</a:t>
+                      </a:r>
+                      <a:r>
+                        <a:rPr lang="de-CH" baseline="0" dirty="0" smtClean="0"/>
+                        <a:t> nach Mixer bestätigen, Mail auslösen, Navigation auf Drink-Detailseite</a:t>
+                      </a:r>
+                      <a:endParaRPr lang="de-CH" dirty="0" smtClean="0"/>
+                    </a:p>
+                  </a:txBody>
+                  <a:tcPr/>
+                </a:tc>
+              </a:tr>
+              <a:tr h="370840">
+                <a:tc>
+                  <a:txBody>
+                    <a:bodyPr/>
+                    <a:lstStyle/>
+                    <a:p>
+                      <a:r>
+                        <a:rPr lang="de-CH" dirty="0" smtClean="0"/>
+                        <a:t>6 – Form Validation</a:t>
+                      </a:r>
+                      <a:endParaRPr lang="de-CH" dirty="0"/>
+                    </a:p>
+                  </a:txBody>
+                  <a:tcPr/>
+                </a:tc>
+                <a:tc>
+                  <a:txBody>
+                    <a:bodyPr/>
+                    <a:lstStyle/>
+                    <a:p>
+                      <a:r>
+                        <a:rPr lang="de-CH" dirty="0" smtClean="0"/>
+                        <a:t>Registration,</a:t>
+                      </a:r>
+                      <a:r>
+                        <a:rPr lang="de-CH" baseline="0" dirty="0" smtClean="0"/>
+                        <a:t> Login</a:t>
+                      </a:r>
+                      <a:endParaRPr lang="de-CH" dirty="0"/>
+                    </a:p>
+                  </a:txBody>
+                  <a:tcPr/>
+                </a:tc>
+              </a:tr>
+              <a:tr h="370840">
+                <a:tc>
+                  <a:txBody>
+                    <a:bodyPr/>
+                    <a:lstStyle/>
+                    <a:p>
+                      <a:r>
+                        <a:rPr lang="de-CH" dirty="0" smtClean="0"/>
+                        <a:t>6 – Dynamic Features</a:t>
+                      </a:r>
+                      <a:endParaRPr lang="de-CH" dirty="0"/>
+                    </a:p>
+                  </a:txBody>
+                  <a:tcPr/>
+                </a:tc>
+                <a:tc>
+                  <a:txBody>
+                    <a:bodyPr/>
+                    <a:lstStyle/>
+                    <a:p>
+                      <a:r>
+                        <a:rPr lang="de-CH" dirty="0" err="1" smtClean="0"/>
+                        <a:t>Lightbox</a:t>
+                      </a:r>
+                      <a:r>
+                        <a:rPr lang="de-CH" dirty="0" smtClean="0"/>
+                        <a:t>, diverse</a:t>
+                      </a:r>
+                      <a:r>
+                        <a:rPr lang="de-CH" baseline="0" dirty="0" smtClean="0"/>
+                        <a:t> kleinere Dinge, </a:t>
+                      </a:r>
+                      <a:r>
+                        <a:rPr lang="de-CH" baseline="0" dirty="0" err="1" smtClean="0"/>
+                        <a:t>Drinkfilterung</a:t>
+                      </a:r>
+                      <a:endParaRPr lang="de-CH" dirty="0"/>
+                    </a:p>
+                  </a:txBody>
+                  <a:tcPr/>
+                </a:tc>
+              </a:tr>
+            </a:tbl>
+          </a:graphicData>
+        </a:graphic>
+      </p:graphicFrame>
+    </p:spTree>
+    <p:extLst>
+      <p:ext uri="{BB962C8B-B14F-4D97-AF65-F5344CB8AC3E}">
+        <p14:creationId xmlns:p14="http://schemas.microsoft.com/office/powerpoint/2010/main" val="4104868263"/>
+      </p:ext>
+    </p:extLst>
+  </p:cSld>
+  <p:clrMapOvr>
+    <a:masterClrMapping/>
+  </p:clrMapOvr>
+  <p:timing>
+    <p:tnLst>
+      <p:par>
+        <p:cTn id="1" dur="indefinite" restart="never" nodeType="tmRoot"/>
+      </p:par>
+    </p:tnLst>
+  </p:timing>
+</p:sld>
+</file>
+
+<file path=ppt/slides/slide6.xml><?xml version="1.0" encoding="utf-8"?>
+<p:sld xmlns:a="http://schemas.openxmlformats.org/drawingml/2006/main" xmlns:r="http://schemas.openxmlformats.org/officeDocument/2006/relationships" xmlns:p="http://schemas.openxmlformats.org/presentationml/2006/main">
+  <p:cSld>
+    <p:spTree>
+      <p:nvGrpSpPr>
+        <p:cNvPr id="1" name=""/>
+        <p:cNvGrpSpPr/>
+        <p:nvPr/>
+      </p:nvGrpSpPr>
+      <p:grpSpPr>
+        <a:xfrm>
+          <a:off x="0" y="0"/>
+          <a:ext cx="0" cy="0"/>
+          <a:chOff x="0" y="0"/>
+          <a:chExt cx="0" cy="0"/>
+        </a:xfrm>
+      </p:grpSpPr>
+      <p:graphicFrame>
+        <p:nvGraphicFramePr>
+          <p:cNvPr id="4" name="Inhaltsplatzhalter 3"/>
+          <p:cNvGraphicFramePr>
+            <a:graphicFrameLocks noGrp="1"/>
+          </p:cNvGraphicFramePr>
+          <p:nvPr>
+            <p:ph idx="1"/>
+            <p:extLst>
+              <p:ext uri="{D42A27DB-BD31-4B8C-83A1-F6EECF244321}">
+                <p14:modId xmlns:p14="http://schemas.microsoft.com/office/powerpoint/2010/main" val="3107146648"/>
+              </p:ext>
+            </p:extLst>
+          </p:nvPr>
+        </p:nvGraphicFramePr>
+        <p:xfrm>
+          <a:off x="560632" y="0"/>
           <a:ext cx="8596312" cy="6873240"/>
         </p:xfrm>
         <a:graphic>

</xml_diff>